<commit_message>
final prep and last few slide changes
</commit_message>
<xml_diff>
--- a/assets/ppt/parsing/fracbits.pptx
+++ b/assets/ppt/parsing/fracbits.pptx
@@ -4017,7 +4017,7 @@
         <p:spPr>
           <a:xfrm>
             <a:off x="2771800" y="4365104"/>
-            <a:ext cx="4011435" cy="461665"/>
+            <a:ext cx="4492787" cy="461665"/>
           </a:xfrm>
           <a:prstGeom prst="rect">
             <a:avLst/>
@@ -4100,7 +4100,15 @@
                   <a:srgbClr val="333399"/>
                 </a:solidFill>
               </a:rPr>
-              <a:t>1 * 2</a:t>
+              <a:t>1 * </a:t>
+            </a:r>
+            <a:r>
+              <a:rPr lang="en-US" dirty="0" smtClean="0">
+                <a:solidFill>
+                  <a:srgbClr val="333399"/>
+                </a:solidFill>
+              </a:rPr>
+              <a:t>2</a:t>
             </a:r>
             <a:r>
               <a:rPr lang="en-US" baseline="30000" dirty="0" smtClean="0">
@@ -4109,6 +4117,14 @@
                 </a:solidFill>
               </a:rPr>
               <a:t>0</a:t>
+            </a:r>
+            <a:r>
+              <a:rPr lang="en-US" dirty="0" smtClean="0">
+                <a:solidFill>
+                  <a:srgbClr val="333399"/>
+                </a:solidFill>
+              </a:rPr>
+              <a:t> = 5</a:t>
             </a:r>
             <a:endParaRPr lang="en-US" baseline="30000" dirty="0">
               <a:solidFill>
@@ -4166,6 +4182,13 @@
   <p:clrMapOvr>
     <a:masterClrMapping/>
   </p:clrMapOvr>
+  <p:timing>
+    <p:tnLst>
+      <p:par>
+        <p:cTn xmlns:p14="http://schemas.microsoft.com/office/powerpoint/2010/main" id="1" dur="indefinite" restart="never" nodeType="tmRoot"/>
+      </p:par>
+    </p:tnLst>
+  </p:timing>
 </p:sld>
 </file>
 
@@ -4194,7 +4217,7 @@
         </p:nvSpPr>
         <p:spPr>
           <a:xfrm>
-            <a:off x="3167528" y="791882"/>
+            <a:off x="1043608" y="692696"/>
             <a:ext cx="2772623" cy="3046988"/>
           </a:xfrm>
           <a:prstGeom prst="rect">
@@ -4282,6 +4305,429 @@
               <a:rPr lang="en-US" sz="3200" dirty="0" smtClean="0"/>
               <a:t> B</a:t>
             </a:r>
+          </a:p>
+          <a:p>
+            <a:r>
+              <a:rPr lang="en-US" sz="3200" dirty="0" smtClean="0"/>
+              <a:t>B </a:t>
+            </a:r>
+            <a:r>
+              <a:rPr lang="en-US" sz="3200" dirty="0">
+                <a:latin typeface="Wingdings"/>
+                <a:ea typeface="Wingdings"/>
+                <a:cs typeface="Wingdings"/>
+              </a:rPr>
+              <a:t></a:t>
+            </a:r>
+            <a:r>
+              <a:rPr lang="en-US" sz="3200" dirty="0" smtClean="0"/>
+              <a:t> "0"</a:t>
+            </a:r>
+          </a:p>
+          <a:p>
+            <a:r>
+              <a:rPr lang="en-US" sz="3200" dirty="0" smtClean="0"/>
+              <a:t>B </a:t>
+            </a:r>
+            <a:r>
+              <a:rPr lang="en-US" sz="3200" dirty="0">
+                <a:latin typeface="Wingdings"/>
+                <a:ea typeface="Wingdings"/>
+                <a:cs typeface="Wingdings"/>
+              </a:rPr>
+              <a:t></a:t>
+            </a:r>
+            <a:r>
+              <a:rPr lang="en-US" sz="3200" dirty="0" smtClean="0"/>
+              <a:t> "1"</a:t>
+            </a:r>
+            <a:endParaRPr lang="en-US" sz="3200" dirty="0"/>
+          </a:p>
+        </p:txBody>
+      </p:sp>
+      <p:sp>
+        <p:nvSpPr>
+          <p:cNvPr id="4" name="TextBox 3"/>
+          <p:cNvSpPr txBox="1"/>
+          <p:nvPr/>
+        </p:nvSpPr>
+        <p:spPr>
+          <a:xfrm>
+            <a:off x="1187624" y="4797152"/>
+            <a:ext cx="6910766" cy="1200328"/>
+          </a:xfrm>
+          <a:prstGeom prst="rect">
+            <a:avLst/>
+          </a:prstGeom>
+          <a:noFill/>
+        </p:spPr>
+        <p:txBody>
+          <a:bodyPr wrap="none" rtlCol="0">
+            <a:spAutoFit/>
+          </a:bodyPr>
+          <a:lstStyle/>
+          <a:p>
+            <a:r>
+              <a:rPr lang="en-US" dirty="0" smtClean="0">
+                <a:solidFill>
+                  <a:schemeClr val="accent2"/>
+                </a:solidFill>
+              </a:rPr>
+              <a:t>Output: 5.625 or 5 + 5/8</a:t>
+            </a:r>
+          </a:p>
+          <a:p>
+            <a:r>
+              <a:rPr lang="en-US" dirty="0" smtClean="0">
+                <a:solidFill>
+                  <a:schemeClr val="accent2"/>
+                </a:solidFill>
+              </a:rPr>
+              <a:t>integer part: 1 </a:t>
+            </a:r>
+            <a:r>
+              <a:rPr lang="en-US" dirty="0" smtClean="0">
+                <a:solidFill>
+                  <a:schemeClr val="accent2"/>
+                </a:solidFill>
+              </a:rPr>
+              <a:t>* 2</a:t>
+            </a:r>
+            <a:r>
+              <a:rPr lang="en-US" baseline="30000" dirty="0" smtClean="0">
+                <a:solidFill>
+                  <a:schemeClr val="accent2"/>
+                </a:solidFill>
+              </a:rPr>
+              <a:t>2</a:t>
+            </a:r>
+            <a:r>
+              <a:rPr lang="en-US" dirty="0" smtClean="0">
+                <a:solidFill>
+                  <a:schemeClr val="accent2"/>
+                </a:solidFill>
+              </a:rPr>
+              <a:t> </a:t>
+            </a:r>
+            <a:r>
+              <a:rPr lang="en-US" dirty="0" smtClean="0"/>
+              <a:t>+ </a:t>
+            </a:r>
+            <a:r>
+              <a:rPr lang="en-US" dirty="0" smtClean="0">
+                <a:solidFill>
+                  <a:srgbClr val="333399"/>
+                </a:solidFill>
+              </a:rPr>
+              <a:t>0 * 2</a:t>
+            </a:r>
+            <a:r>
+              <a:rPr lang="en-US" baseline="30000" dirty="0" smtClean="0">
+                <a:solidFill>
+                  <a:srgbClr val="333399"/>
+                </a:solidFill>
+              </a:rPr>
+              <a:t>1</a:t>
+            </a:r>
+            <a:r>
+              <a:rPr lang="en-US" dirty="0" smtClean="0">
+                <a:solidFill>
+                  <a:srgbClr val="333399"/>
+                </a:solidFill>
+              </a:rPr>
+              <a:t> </a:t>
+            </a:r>
+            <a:r>
+              <a:rPr lang="en-US" dirty="0" smtClean="0"/>
+              <a:t>+ </a:t>
+            </a:r>
+            <a:r>
+              <a:rPr lang="en-US" dirty="0" smtClean="0">
+                <a:solidFill>
+                  <a:srgbClr val="333399"/>
+                </a:solidFill>
+              </a:rPr>
+              <a:t>1 * </a:t>
+            </a:r>
+            <a:r>
+              <a:rPr lang="en-US" dirty="0" smtClean="0">
+                <a:solidFill>
+                  <a:srgbClr val="333399"/>
+                </a:solidFill>
+              </a:rPr>
+              <a:t>2</a:t>
+            </a:r>
+            <a:r>
+              <a:rPr lang="en-US" baseline="30000" dirty="0" smtClean="0">
+                <a:solidFill>
+                  <a:srgbClr val="333399"/>
+                </a:solidFill>
+              </a:rPr>
+              <a:t>0</a:t>
+            </a:r>
+            <a:r>
+              <a:rPr lang="en-US" dirty="0" smtClean="0">
+                <a:solidFill>
+                  <a:srgbClr val="333399"/>
+                </a:solidFill>
+              </a:rPr>
+              <a:t> = 5</a:t>
+            </a:r>
+          </a:p>
+          <a:p>
+            <a:r>
+              <a:rPr lang="en-US" dirty="0" smtClean="0">
+                <a:solidFill>
+                  <a:srgbClr val="333399"/>
+                </a:solidFill>
+              </a:rPr>
+              <a:t>fractional part: 1 * (1/2</a:t>
+            </a:r>
+            <a:r>
+              <a:rPr lang="en-US" baseline="30000" dirty="0" smtClean="0">
+                <a:solidFill>
+                  <a:srgbClr val="333399"/>
+                </a:solidFill>
+              </a:rPr>
+              <a:t>1</a:t>
+            </a:r>
+            <a:r>
+              <a:rPr lang="en-US" dirty="0" smtClean="0">
+                <a:solidFill>
+                  <a:srgbClr val="333399"/>
+                </a:solidFill>
+              </a:rPr>
+              <a:t>) + 0 * (1/2</a:t>
+            </a:r>
+            <a:r>
+              <a:rPr lang="en-US" baseline="30000" dirty="0" smtClean="0">
+                <a:solidFill>
+                  <a:srgbClr val="333399"/>
+                </a:solidFill>
+              </a:rPr>
+              <a:t>2</a:t>
+            </a:r>
+            <a:r>
+              <a:rPr lang="en-US" dirty="0" smtClean="0">
+                <a:solidFill>
+                  <a:srgbClr val="333399"/>
+                </a:solidFill>
+              </a:rPr>
+              <a:t>) + 1 * (1/2</a:t>
+            </a:r>
+            <a:r>
+              <a:rPr lang="en-US" baseline="30000" dirty="0" smtClean="0">
+                <a:solidFill>
+                  <a:srgbClr val="333399"/>
+                </a:solidFill>
+              </a:rPr>
+              <a:t>3</a:t>
+            </a:r>
+            <a:r>
+              <a:rPr lang="en-US" dirty="0" smtClean="0">
+                <a:solidFill>
+                  <a:srgbClr val="333399"/>
+                </a:solidFill>
+              </a:rPr>
+              <a:t>) = 5/8</a:t>
+            </a:r>
+            <a:endParaRPr lang="en-US" dirty="0">
+              <a:solidFill>
+                <a:srgbClr val="333399"/>
+              </a:solidFill>
+            </a:endParaRPr>
+          </a:p>
+        </p:txBody>
+      </p:sp>
+      <p:sp>
+        <p:nvSpPr>
+          <p:cNvPr id="5" name="TextBox 4"/>
+          <p:cNvSpPr txBox="1"/>
+          <p:nvPr/>
+        </p:nvSpPr>
+        <p:spPr>
+          <a:xfrm>
+            <a:off x="1187624" y="4221088"/>
+            <a:ext cx="1997061" cy="461665"/>
+          </a:xfrm>
+          <a:prstGeom prst="rect">
+            <a:avLst/>
+          </a:prstGeom>
+          <a:noFill/>
+        </p:spPr>
+        <p:txBody>
+          <a:bodyPr wrap="none" rtlCol="0">
+            <a:spAutoFit/>
+          </a:bodyPr>
+          <a:lstStyle/>
+          <a:p>
+            <a:r>
+              <a:rPr lang="en-US" dirty="0" smtClean="0">
+                <a:solidFill>
+                  <a:schemeClr val="accent2"/>
+                </a:solidFill>
+              </a:rPr>
+              <a:t>Input: 101.101</a:t>
+            </a:r>
+            <a:endParaRPr lang="en-US" baseline="30000" dirty="0">
+              <a:solidFill>
+                <a:srgbClr val="333399"/>
+              </a:solidFill>
+            </a:endParaRPr>
+          </a:p>
+        </p:txBody>
+      </p:sp>
+      <p:sp>
+        <p:nvSpPr>
+          <p:cNvPr id="6" name="TextBox 5"/>
+          <p:cNvSpPr txBox="1"/>
+          <p:nvPr/>
+        </p:nvSpPr>
+        <p:spPr>
+          <a:xfrm>
+            <a:off x="4860032" y="836712"/>
+            <a:ext cx="2772623" cy="4031873"/>
+          </a:xfrm>
+          <a:prstGeom prst="rect">
+            <a:avLst/>
+          </a:prstGeom>
+          <a:noFill/>
+        </p:spPr>
+        <p:txBody>
+          <a:bodyPr wrap="square" rtlCol="0">
+            <a:spAutoFit/>
+          </a:bodyPr>
+          <a:lstStyle/>
+          <a:p>
+            <a:r>
+              <a:rPr lang="en-US" sz="3200" dirty="0" smtClean="0"/>
+              <a:t>S </a:t>
+            </a:r>
+            <a:r>
+              <a:rPr lang="en-US" sz="3200" dirty="0" smtClean="0">
+                <a:latin typeface="Wingdings"/>
+                <a:ea typeface="Wingdings"/>
+                <a:cs typeface="Wingdings"/>
+              </a:rPr>
+              <a:t></a:t>
+            </a:r>
+            <a:r>
+              <a:rPr lang="en-US" sz="3200" dirty="0" smtClean="0"/>
+              <a:t> L</a:t>
+            </a:r>
+          </a:p>
+          <a:p>
+            <a:r>
+              <a:rPr lang="en-US" sz="3200" dirty="0"/>
+              <a:t>S </a:t>
+            </a:r>
+            <a:r>
+              <a:rPr lang="en-US" sz="3200" dirty="0">
+                <a:latin typeface="Wingdings"/>
+                <a:ea typeface="Wingdings"/>
+                <a:cs typeface="Wingdings"/>
+              </a:rPr>
+              <a:t></a:t>
+            </a:r>
+            <a:r>
+              <a:rPr lang="en-US" sz="3200" dirty="0"/>
+              <a:t> </a:t>
+            </a:r>
+            <a:r>
+              <a:rPr lang="en-US" sz="3200" dirty="0" smtClean="0"/>
+              <a:t>L "." </a:t>
+            </a:r>
+            <a:r>
+              <a:rPr lang="en-US" sz="3200" dirty="0" smtClean="0"/>
+              <a:t>R</a:t>
+            </a:r>
+            <a:endParaRPr lang="en-US" sz="3200" dirty="0" smtClean="0"/>
+          </a:p>
+          <a:p>
+            <a:r>
+              <a:rPr lang="en-US" sz="3200" dirty="0" smtClean="0"/>
+              <a:t>L </a:t>
+            </a:r>
+            <a:r>
+              <a:rPr lang="en-US" sz="3200" dirty="0">
+                <a:latin typeface="Wingdings"/>
+                <a:ea typeface="Wingdings"/>
+                <a:cs typeface="Wingdings"/>
+              </a:rPr>
+              <a:t></a:t>
+            </a:r>
+            <a:r>
+              <a:rPr lang="en-US" sz="3200" dirty="0" smtClean="0"/>
+              <a:t> L B</a:t>
+            </a:r>
+          </a:p>
+          <a:p>
+            <a:r>
+              <a:rPr lang="en-US" sz="3200" dirty="0" smtClean="0"/>
+              <a:t>L </a:t>
+            </a:r>
+            <a:r>
+              <a:rPr lang="en-US" sz="3200" dirty="0">
+                <a:latin typeface="Wingdings"/>
+                <a:ea typeface="Wingdings"/>
+                <a:cs typeface="Wingdings"/>
+              </a:rPr>
+              <a:t></a:t>
+            </a:r>
+            <a:r>
+              <a:rPr lang="en-US" sz="3200" dirty="0" smtClean="0"/>
+              <a:t> </a:t>
+            </a:r>
+            <a:r>
+              <a:rPr lang="en-US" sz="3200" dirty="0" smtClean="0"/>
+              <a:t>B</a:t>
+            </a:r>
+          </a:p>
+          <a:p>
+            <a:r>
+              <a:rPr lang="en-US" sz="3200" dirty="0" smtClean="0"/>
+              <a:t>R </a:t>
+            </a:r>
+            <a:r>
+              <a:rPr lang="en-US" sz="3200" dirty="0">
+                <a:latin typeface="Wingdings"/>
+                <a:ea typeface="Wingdings"/>
+                <a:cs typeface="Wingdings"/>
+              </a:rPr>
+              <a:t></a:t>
+            </a:r>
+            <a:r>
+              <a:rPr lang="en-US" sz="3200" dirty="0"/>
+              <a:t> </a:t>
+            </a:r>
+            <a:r>
+              <a:rPr lang="en-US" sz="3200" dirty="0" smtClean="0"/>
+              <a:t>B R</a:t>
+            </a:r>
+            <a:endParaRPr lang="en-US" sz="3200" dirty="0"/>
+          </a:p>
+          <a:p>
+            <a:r>
+              <a:rPr lang="en-US" sz="3200" dirty="0" smtClean="0"/>
+              <a:t>R </a:t>
+            </a:r>
+            <a:r>
+              <a:rPr lang="en-US" sz="3200" dirty="0">
+                <a:latin typeface="Wingdings"/>
+                <a:ea typeface="Wingdings"/>
+                <a:cs typeface="Wingdings"/>
+              </a:rPr>
+              <a:t></a:t>
+            </a:r>
+            <a:r>
+              <a:rPr lang="en-US" sz="3200" dirty="0"/>
+              <a:t> </a:t>
+            </a:r>
+            <a:r>
+              <a:rPr lang="en-US" sz="3200" dirty="0" smtClean="0"/>
+              <a:t>B</a:t>
+            </a:r>
+            <a:endParaRPr lang="en-US" sz="3200" dirty="0" smtClean="0"/>
           </a:p>
           <a:p>
             <a:r>
@@ -4332,6 +4778,13 @@
   <p:clrMapOvr>
     <a:masterClrMapping/>
   </p:clrMapOvr>
+  <p:timing>
+    <p:tnLst>
+      <p:par>
+        <p:cTn xmlns:p14="http://schemas.microsoft.com/office/powerpoint/2010/main" id="1" dur="indefinite" restart="never" nodeType="tmRoot"/>
+      </p:par>
+    </p:tnLst>
+  </p:timing>
 </p:sld>
 </file>
 
@@ -4378,13 +4831,13 @@
       </p:sp>
       <p:sp>
         <p:nvSpPr>
-          <p:cNvPr id="7" name="TextBox 6"/>
+          <p:cNvPr id="8" name="TextBox 7"/>
           <p:cNvSpPr txBox="1"/>
           <p:nvPr/>
         </p:nvSpPr>
         <p:spPr>
           <a:xfrm>
-            <a:off x="4734995" y="0"/>
+            <a:off x="4724400" y="685800"/>
             <a:ext cx="355837" cy="461665"/>
           </a:xfrm>
           <a:prstGeom prst="rect">
@@ -4406,68 +4859,6 @@
           </a:p>
         </p:txBody>
       </p:sp>
-      <p:sp>
-        <p:nvSpPr>
-          <p:cNvPr id="8" name="TextBox 7"/>
-          <p:cNvSpPr txBox="1"/>
-          <p:nvPr/>
-        </p:nvSpPr>
-        <p:spPr>
-          <a:xfrm>
-            <a:off x="4724400" y="685800"/>
-            <a:ext cx="377026" cy="461665"/>
-          </a:xfrm>
-          <a:prstGeom prst="rect">
-            <a:avLst/>
-          </a:prstGeom>
-          <a:noFill/>
-        </p:spPr>
-        <p:txBody>
-          <a:bodyPr wrap="none" rtlCol="0">
-            <a:spAutoFit/>
-          </a:bodyPr>
-          <a:lstStyle/>
-          <a:p>
-            <a:r>
-              <a:rPr lang="en-US" dirty="0" smtClean="0"/>
-              <a:t>L</a:t>
-            </a:r>
-            <a:endParaRPr lang="en-US" dirty="0"/>
-          </a:p>
-        </p:txBody>
-      </p:sp>
-      <p:cxnSp>
-        <p:nvCxnSpPr>
-          <p:cNvPr id="12" name="Straight Connector 11"/>
-          <p:cNvCxnSpPr>
-            <a:stCxn id="7" idx="2"/>
-            <a:endCxn id="8" idx="0"/>
-          </p:cNvCxnSpPr>
-          <p:nvPr/>
-        </p:nvCxnSpPr>
-        <p:spPr bwMode="auto">
-          <a:xfrm rot="5400000">
-            <a:off x="4800847" y="573732"/>
-            <a:ext cx="224135" cy="1"/>
-          </a:xfrm>
-          <a:prstGeom prst="line">
-            <a:avLst/>
-          </a:prstGeom>
-          <a:solidFill>
-            <a:schemeClr val="accent1"/>
-          </a:solidFill>
-          <a:ln w="9525" cap="flat" cmpd="sng" algn="ctr">
-            <a:solidFill>
-              <a:schemeClr val="tx1"/>
-            </a:solidFill>
-            <a:prstDash val="solid"/>
-            <a:round/>
-            <a:headEnd type="none" w="med" len="med"/>
-            <a:tailEnd type="none" w="med" len="med"/>
-          </a:ln>
-          <a:effectLst/>
-        </p:spPr>
-      </p:cxnSp>
       <p:sp>
         <p:nvSpPr>
           <p:cNvPr id="9" name="TextBox 8"/>
@@ -4538,9 +4929,9 @@
           <p:nvPr/>
         </p:nvCxnSpPr>
         <p:spPr bwMode="auto">
-          <a:xfrm rot="5400000">
-            <a:off x="3784906" y="395992"/>
-            <a:ext cx="376535" cy="1879481"/>
+          <a:xfrm flipH="1">
+            <a:off x="3033432" y="1147465"/>
+            <a:ext cx="1868887" cy="376535"/>
           </a:xfrm>
           <a:prstGeom prst="line">
             <a:avLst/>
@@ -4570,9 +4961,9 @@
           <p:nvPr/>
         </p:nvCxnSpPr>
         <p:spPr bwMode="auto">
-          <a:xfrm rot="16200000" flipH="1">
-            <a:off x="5728005" y="332372"/>
-            <a:ext cx="376535" cy="2006719"/>
+          <a:xfrm>
+            <a:off x="4902319" y="1147465"/>
+            <a:ext cx="2017313" cy="376535"/>
           </a:xfrm>
           <a:prstGeom prst="line">
             <a:avLst/>
@@ -5946,9 +6337,9 @@
           <p:nvPr/>
         </p:nvCxnSpPr>
         <p:spPr bwMode="auto">
-          <a:xfrm rot="5400000">
-            <a:off x="4719349" y="1330435"/>
-            <a:ext cx="376535" cy="10594"/>
+          <a:xfrm>
+            <a:off x="4902319" y="1147465"/>
+            <a:ext cx="0" cy="376535"/>
           </a:xfrm>
           <a:prstGeom prst="line">
             <a:avLst/>
@@ -6870,7 +7261,7 @@
                                           </p:stCondLst>
                                         </p:cTn>
                                         <p:tgtEl>
-                                          <p:spTgt spid="7"/>
+                                          <p:spTgt spid="8"/>
                                         </p:tgtEl>
                                         <p:attrNameLst>
                                           <p:attrName>style.visibility</p:attrName>
@@ -6915,7 +7306,7 @@
                                           </p:stCondLst>
                                         </p:cTn>
                                         <p:tgtEl>
-                                          <p:spTgt spid="12"/>
+                                          <p:spTgt spid="17"/>
                                         </p:tgtEl>
                                         <p:attrNameLst>
                                           <p:attrName>style.visibility</p:attrName>
@@ -6960,7 +7351,7 @@
                                           </p:stCondLst>
                                         </p:cTn>
                                         <p:tgtEl>
-                                          <p:spTgt spid="8"/>
+                                          <p:spTgt spid="9"/>
                                         </p:tgtEl>
                                         <p:attrNameLst>
                                           <p:attrName>style.visibility</p:attrName>
@@ -7005,7 +7396,7 @@
                                           </p:stCondLst>
                                         </p:cTn>
                                         <p:tgtEl>
-                                          <p:spTgt spid="17"/>
+                                          <p:spTgt spid="97"/>
                                         </p:tgtEl>
                                         <p:attrNameLst>
                                           <p:attrName>style.visibility</p:attrName>
@@ -7050,7 +7441,7 @@
                                           </p:stCondLst>
                                         </p:cTn>
                                         <p:tgtEl>
-                                          <p:spTgt spid="9"/>
+                                          <p:spTgt spid="95"/>
                                         </p:tgtEl>
                                         <p:attrNameLst>
                                           <p:attrName>style.visibility</p:attrName>
@@ -7095,7 +7486,7 @@
                                           </p:stCondLst>
                                         </p:cTn>
                                         <p:tgtEl>
-                                          <p:spTgt spid="97"/>
+                                          <p:spTgt spid="19"/>
                                         </p:tgtEl>
                                         <p:attrNameLst>
                                           <p:attrName>style.visibility</p:attrName>
@@ -7140,7 +7531,7 @@
                                           </p:stCondLst>
                                         </p:cTn>
                                         <p:tgtEl>
-                                          <p:spTgt spid="95"/>
+                                          <p:spTgt spid="10"/>
                                         </p:tgtEl>
                                         <p:attrNameLst>
                                           <p:attrName>style.visibility</p:attrName>
@@ -7185,7 +7576,7 @@
                                           </p:stCondLst>
                                         </p:cTn>
                                         <p:tgtEl>
-                                          <p:spTgt spid="19"/>
+                                          <p:spTgt spid="27"/>
                                         </p:tgtEl>
                                         <p:attrNameLst>
                                           <p:attrName>style.visibility</p:attrName>
@@ -7230,7 +7621,7 @@
                                           </p:stCondLst>
                                         </p:cTn>
                                         <p:tgtEl>
-                                          <p:spTgt spid="10"/>
+                                          <p:spTgt spid="25"/>
                                         </p:tgtEl>
                                         <p:attrNameLst>
                                           <p:attrName>style.visibility</p:attrName>
@@ -7275,7 +7666,7 @@
                                           </p:stCondLst>
                                         </p:cTn>
                                         <p:tgtEl>
-                                          <p:spTgt spid="27"/>
+                                          <p:spTgt spid="28"/>
                                         </p:tgtEl>
                                         <p:attrNameLst>
                                           <p:attrName>style.visibility</p:attrName>
@@ -7320,7 +7711,7 @@
                                           </p:stCondLst>
                                         </p:cTn>
                                         <p:tgtEl>
-                                          <p:spTgt spid="25"/>
+                                          <p:spTgt spid="26"/>
                                         </p:tgtEl>
                                         <p:attrNameLst>
                                           <p:attrName>style.visibility</p:attrName>
@@ -7365,7 +7756,7 @@
                                           </p:stCondLst>
                                         </p:cTn>
                                         <p:tgtEl>
-                                          <p:spTgt spid="28"/>
+                                          <p:spTgt spid="37"/>
                                         </p:tgtEl>
                                         <p:attrNameLst>
                                           <p:attrName>style.visibility</p:attrName>
@@ -7410,7 +7801,7 @@
                                           </p:stCondLst>
                                         </p:cTn>
                                         <p:tgtEl>
-                                          <p:spTgt spid="26"/>
+                                          <p:spTgt spid="35"/>
                                         </p:tgtEl>
                                         <p:attrNameLst>
                                           <p:attrName>style.visibility</p:attrName>
@@ -7455,7 +7846,7 @@
                                           </p:stCondLst>
                                         </p:cTn>
                                         <p:tgtEl>
-                                          <p:spTgt spid="37"/>
+                                          <p:spTgt spid="38"/>
                                         </p:tgtEl>
                                         <p:attrNameLst>
                                           <p:attrName>style.visibility</p:attrName>
@@ -7500,7 +7891,7 @@
                                           </p:stCondLst>
                                         </p:cTn>
                                         <p:tgtEl>
-                                          <p:spTgt spid="35"/>
+                                          <p:spTgt spid="36"/>
                                         </p:tgtEl>
                                         <p:attrNameLst>
                                           <p:attrName>style.visibility</p:attrName>
@@ -7545,7 +7936,7 @@
                                           </p:stCondLst>
                                         </p:cTn>
                                         <p:tgtEl>
-                                          <p:spTgt spid="38"/>
+                                          <p:spTgt spid="71"/>
                                         </p:tgtEl>
                                         <p:attrNameLst>
                                           <p:attrName>style.visibility</p:attrName>
@@ -7590,7 +7981,7 @@
                                           </p:stCondLst>
                                         </p:cTn>
                                         <p:tgtEl>
-                                          <p:spTgt spid="36"/>
+                                          <p:spTgt spid="64"/>
                                         </p:tgtEl>
                                         <p:attrNameLst>
                                           <p:attrName>style.visibility</p:attrName>
@@ -7622,7 +8013,7 @@
                             </p:stCondLst>
                             <p:childTnLst>
                               <p:par>
-                                <p:cTn id="73" presetID="1" presetClass="entr" presetSubtype="0" fill="hold" nodeType="clickEffect">
+                                <p:cTn id="73" presetID="1" presetClass="entr" presetSubtype="0" fill="hold" grpId="0" nodeType="clickEffect">
                                   <p:stCondLst>
                                     <p:cond delay="0"/>
                                   </p:stCondLst>
@@ -7635,7 +8026,7 @@
                                           </p:stCondLst>
                                         </p:cTn>
                                         <p:tgtEl>
-                                          <p:spTgt spid="71"/>
+                                          <p:spTgt spid="76"/>
                                         </p:tgtEl>
                                         <p:attrNameLst>
                                           <p:attrName>style.visibility</p:attrName>
@@ -7680,7 +8071,7 @@
                                           </p:stCondLst>
                                         </p:cTn>
                                         <p:tgtEl>
-                                          <p:spTgt spid="64"/>
+                                          <p:spTgt spid="75"/>
                                         </p:tgtEl>
                                         <p:attrNameLst>
                                           <p:attrName>style.visibility</p:attrName>
@@ -7725,7 +8116,7 @@
                                           </p:stCondLst>
                                         </p:cTn>
                                         <p:tgtEl>
-                                          <p:spTgt spid="76"/>
+                                          <p:spTgt spid="74"/>
                                         </p:tgtEl>
                                         <p:attrNameLst>
                                           <p:attrName>style.visibility</p:attrName>
@@ -7757,7 +8148,7 @@
                             </p:stCondLst>
                             <p:childTnLst>
                               <p:par>
-                                <p:cTn id="85" presetID="1" presetClass="entr" presetSubtype="0" fill="hold" grpId="0" nodeType="clickEffect">
+                                <p:cTn id="85" presetID="1" presetClass="entr" presetSubtype="0" fill="hold" nodeType="clickEffect">
                                   <p:stCondLst>
                                     <p:cond delay="0"/>
                                   </p:stCondLst>
@@ -7770,7 +8161,7 @@
                                           </p:stCondLst>
                                         </p:cTn>
                                         <p:tgtEl>
-                                          <p:spTgt spid="75"/>
+                                          <p:spTgt spid="84"/>
                                         </p:tgtEl>
                                         <p:attrNameLst>
                                           <p:attrName>style.visibility</p:attrName>
@@ -7815,7 +8206,7 @@
                                           </p:stCondLst>
                                         </p:cTn>
                                         <p:tgtEl>
-                                          <p:spTgt spid="74"/>
+                                          <p:spTgt spid="80"/>
                                         </p:tgtEl>
                                         <p:attrNameLst>
                                           <p:attrName>style.visibility</p:attrName>
@@ -7860,7 +8251,7 @@
                                           </p:stCondLst>
                                         </p:cTn>
                                         <p:tgtEl>
-                                          <p:spTgt spid="84"/>
+                                          <p:spTgt spid="86"/>
                                         </p:tgtEl>
                                         <p:attrNameLst>
                                           <p:attrName>style.visibility</p:attrName>
@@ -7905,7 +8296,7 @@
                                           </p:stCondLst>
                                         </p:cTn>
                                         <p:tgtEl>
-                                          <p:spTgt spid="80"/>
+                                          <p:spTgt spid="81"/>
                                         </p:tgtEl>
                                         <p:attrNameLst>
                                           <p:attrName>style.visibility</p:attrName>
@@ -7950,7 +8341,7 @@
                                           </p:stCondLst>
                                         </p:cTn>
                                         <p:tgtEl>
-                                          <p:spTgt spid="86"/>
+                                          <p:spTgt spid="88"/>
                                         </p:tgtEl>
                                         <p:attrNameLst>
                                           <p:attrName>style.visibility</p:attrName>
@@ -7995,7 +8386,7 @@
                                           </p:stCondLst>
                                         </p:cTn>
                                         <p:tgtEl>
-                                          <p:spTgt spid="81"/>
+                                          <p:spTgt spid="82"/>
                                         </p:tgtEl>
                                         <p:attrNameLst>
                                           <p:attrName>style.visibility</p:attrName>
@@ -8027,7 +8418,7 @@
                             </p:stCondLst>
                             <p:childTnLst>
                               <p:par>
-                                <p:cTn id="109" presetID="1" presetClass="entr" presetSubtype="0" fill="hold" nodeType="clickEffect">
+                                <p:cTn id="109" presetID="1" presetClass="entr" presetSubtype="0" fill="hold" grpId="0" nodeType="clickEffect">
                                   <p:stCondLst>
                                     <p:cond delay="0"/>
                                   </p:stCondLst>
@@ -8040,7 +8431,7 @@
                                           </p:stCondLst>
                                         </p:cTn>
                                         <p:tgtEl>
-                                          <p:spTgt spid="88"/>
+                                          <p:spTgt spid="107"/>
                                         </p:tgtEl>
                                         <p:attrNameLst>
                                           <p:attrName>style.visibility</p:attrName>
@@ -8072,7 +8463,7 @@
                             </p:stCondLst>
                             <p:childTnLst>
                               <p:par>
-                                <p:cTn id="113" presetID="1" presetClass="entr" presetSubtype="0" fill="hold" grpId="0" nodeType="clickEffect">
+                                <p:cTn id="113" presetID="1" presetClass="entr" presetSubtype="0" fill="hold" nodeType="clickEffect">
                                   <p:stCondLst>
                                     <p:cond delay="0"/>
                                   </p:stCondLst>
@@ -8085,7 +8476,7 @@
                                           </p:stCondLst>
                                         </p:cTn>
                                         <p:tgtEl>
-                                          <p:spTgt spid="82"/>
+                                          <p:spTgt spid="110"/>
                                         </p:tgtEl>
                                         <p:attrNameLst>
                                           <p:attrName>style.visibility</p:attrName>
@@ -8130,7 +8521,7 @@
                                           </p:stCondLst>
                                         </p:cTn>
                                         <p:tgtEl>
-                                          <p:spTgt spid="107"/>
+                                          <p:spTgt spid="106"/>
                                         </p:tgtEl>
                                         <p:attrNameLst>
                                           <p:attrName>style.visibility</p:attrName>
@@ -8175,7 +8566,7 @@
                                           </p:stCondLst>
                                         </p:cTn>
                                         <p:tgtEl>
-                                          <p:spTgt spid="110"/>
+                                          <p:spTgt spid="109"/>
                                         </p:tgtEl>
                                         <p:attrNameLst>
                                           <p:attrName>style.visibility</p:attrName>
@@ -8220,7 +8611,7 @@
                                           </p:stCondLst>
                                         </p:cTn>
                                         <p:tgtEl>
-                                          <p:spTgt spid="106"/>
+                                          <p:spTgt spid="105"/>
                                         </p:tgtEl>
                                         <p:attrNameLst>
                                           <p:attrName>style.visibility</p:attrName>
@@ -8265,7 +8656,7 @@
                                           </p:stCondLst>
                                         </p:cTn>
                                         <p:tgtEl>
-                                          <p:spTgt spid="109"/>
+                                          <p:spTgt spid="108"/>
                                         </p:tgtEl>
                                         <p:attrNameLst>
                                           <p:attrName>style.visibility</p:attrName>
@@ -8297,7 +8688,7 @@
                             </p:stCondLst>
                             <p:childTnLst>
                               <p:par>
-                                <p:cTn id="133" presetID="1" presetClass="entr" presetSubtype="0" fill="hold" grpId="0" nodeType="clickEffect">
+                                <p:cTn id="133" presetID="1" presetClass="entr" presetSubtype="0" fill="hold" nodeType="clickEffect">
                                   <p:stCondLst>
                                     <p:cond delay="0"/>
                                   </p:stCondLst>
@@ -8310,7 +8701,7 @@
                                           </p:stCondLst>
                                         </p:cTn>
                                         <p:tgtEl>
-                                          <p:spTgt spid="105"/>
+                                          <p:spTgt spid="32"/>
                                         </p:tgtEl>
                                         <p:attrNameLst>
                                           <p:attrName>style.visibility</p:attrName>
@@ -8342,7 +8733,7 @@
                             </p:stCondLst>
                             <p:childTnLst>
                               <p:par>
-                                <p:cTn id="137" presetID="1" presetClass="entr" presetSubtype="0" fill="hold" nodeType="clickEffect">
+                                <p:cTn id="137" presetID="1" presetClass="entr" presetSubtype="0" fill="hold" grpId="0" nodeType="clickEffect">
                                   <p:stCondLst>
                                     <p:cond delay="0"/>
                                   </p:stCondLst>
@@ -8355,7 +8746,7 @@
                                           </p:stCondLst>
                                         </p:cTn>
                                         <p:tgtEl>
-                                          <p:spTgt spid="108"/>
+                                          <p:spTgt spid="30"/>
                                         </p:tgtEl>
                                         <p:attrNameLst>
                                           <p:attrName>style.visibility</p:attrName>
@@ -8400,7 +8791,7 @@
                                           </p:stCondLst>
                                         </p:cTn>
                                         <p:tgtEl>
-                                          <p:spTgt spid="32"/>
+                                          <p:spTgt spid="33"/>
                                         </p:tgtEl>
                                         <p:attrNameLst>
                                           <p:attrName>style.visibility</p:attrName>
@@ -8445,7 +8836,7 @@
                                           </p:stCondLst>
                                         </p:cTn>
                                         <p:tgtEl>
-                                          <p:spTgt spid="30"/>
+                                          <p:spTgt spid="31"/>
                                         </p:tgtEl>
                                         <p:attrNameLst>
                                           <p:attrName>style.visibility</p:attrName>
@@ -8490,7 +8881,7 @@
                                           </p:stCondLst>
                                         </p:cTn>
                                         <p:tgtEl>
-                                          <p:spTgt spid="33"/>
+                                          <p:spTgt spid="42"/>
                                         </p:tgtEl>
                                         <p:attrNameLst>
                                           <p:attrName>style.visibility</p:attrName>
@@ -8535,7 +8926,7 @@
                                           </p:stCondLst>
                                         </p:cTn>
                                         <p:tgtEl>
-                                          <p:spTgt spid="31"/>
+                                          <p:spTgt spid="40"/>
                                         </p:tgtEl>
                                         <p:attrNameLst>
                                           <p:attrName>style.visibility</p:attrName>
@@ -8580,7 +8971,7 @@
                                           </p:stCondLst>
                                         </p:cTn>
                                         <p:tgtEl>
-                                          <p:spTgt spid="42"/>
+                                          <p:spTgt spid="43"/>
                                         </p:tgtEl>
                                         <p:attrNameLst>
                                           <p:attrName>style.visibility</p:attrName>
@@ -8625,7 +9016,7 @@
                                           </p:stCondLst>
                                         </p:cTn>
                                         <p:tgtEl>
-                                          <p:spTgt spid="40"/>
+                                          <p:spTgt spid="41"/>
                                         </p:tgtEl>
                                         <p:attrNameLst>
                                           <p:attrName>style.visibility</p:attrName>
@@ -8670,7 +9061,7 @@
                                           </p:stCondLst>
                                         </p:cTn>
                                         <p:tgtEl>
-                                          <p:spTgt spid="43"/>
+                                          <p:spTgt spid="73"/>
                                         </p:tgtEl>
                                         <p:attrNameLst>
                                           <p:attrName>style.visibility</p:attrName>
@@ -8715,7 +9106,7 @@
                                           </p:stCondLst>
                                         </p:cTn>
                                         <p:tgtEl>
-                                          <p:spTgt spid="41"/>
+                                          <p:spTgt spid="65"/>
                                         </p:tgtEl>
                                         <p:attrNameLst>
                                           <p:attrName>style.visibility</p:attrName>
@@ -8747,7 +9138,7 @@
                             </p:stCondLst>
                             <p:childTnLst>
                               <p:par>
-                                <p:cTn id="173" presetID="1" presetClass="entr" presetSubtype="0" fill="hold" nodeType="clickEffect">
+                                <p:cTn id="173" presetID="1" presetClass="entr" presetSubtype="0" fill="hold" grpId="0" nodeType="clickEffect">
                                   <p:stCondLst>
                                     <p:cond delay="0"/>
                                   </p:stCondLst>
@@ -8760,7 +9151,7 @@
                                           </p:stCondLst>
                                         </p:cTn>
                                         <p:tgtEl>
-                                          <p:spTgt spid="73"/>
+                                          <p:spTgt spid="77"/>
                                         </p:tgtEl>
                                         <p:attrNameLst>
                                           <p:attrName>style.visibility</p:attrName>
@@ -8805,7 +9196,7 @@
                                           </p:stCondLst>
                                         </p:cTn>
                                         <p:tgtEl>
-                                          <p:spTgt spid="65"/>
+                                          <p:spTgt spid="78"/>
                                         </p:tgtEl>
                                         <p:attrNameLst>
                                           <p:attrName>style.visibility</p:attrName>
@@ -8850,7 +9241,7 @@
                                           </p:stCondLst>
                                         </p:cTn>
                                         <p:tgtEl>
-                                          <p:spTgt spid="77"/>
+                                          <p:spTgt spid="79"/>
                                         </p:tgtEl>
                                         <p:attrNameLst>
                                           <p:attrName>style.visibility</p:attrName>
@@ -8895,7 +9286,7 @@
                                           </p:stCondLst>
                                         </p:cTn>
                                         <p:tgtEl>
-                                          <p:spTgt spid="78"/>
+                                          <p:spTgt spid="91"/>
                                         </p:tgtEl>
                                         <p:attrNameLst>
                                           <p:attrName>style.visibility</p:attrName>
@@ -8927,7 +9318,7 @@
                             </p:stCondLst>
                             <p:childTnLst>
                               <p:par>
-                                <p:cTn id="189" presetID="1" presetClass="entr" presetSubtype="0" fill="hold" grpId="0" nodeType="clickEffect">
+                                <p:cTn id="189" presetID="1" presetClass="entr" presetSubtype="0" fill="hold" nodeType="clickEffect">
                                   <p:stCondLst>
                                     <p:cond delay="0"/>
                                   </p:stCondLst>
@@ -8940,7 +9331,7 @@
                                           </p:stCondLst>
                                         </p:cTn>
                                         <p:tgtEl>
-                                          <p:spTgt spid="79"/>
+                                          <p:spTgt spid="94"/>
                                         </p:tgtEl>
                                         <p:attrNameLst>
                                           <p:attrName>style.visibility</p:attrName>
@@ -8985,7 +9376,7 @@
                                           </p:stCondLst>
                                         </p:cTn>
                                         <p:tgtEl>
-                                          <p:spTgt spid="91"/>
+                                          <p:spTgt spid="90"/>
                                         </p:tgtEl>
                                         <p:attrNameLst>
                                           <p:attrName>style.visibility</p:attrName>
@@ -9030,7 +9421,7 @@
                                           </p:stCondLst>
                                         </p:cTn>
                                         <p:tgtEl>
-                                          <p:spTgt spid="94"/>
+                                          <p:spTgt spid="93"/>
                                         </p:tgtEl>
                                         <p:attrNameLst>
                                           <p:attrName>style.visibility</p:attrName>
@@ -9075,7 +9466,7 @@
                                           </p:stCondLst>
                                         </p:cTn>
                                         <p:tgtEl>
-                                          <p:spTgt spid="90"/>
+                                          <p:spTgt spid="89"/>
                                         </p:tgtEl>
                                         <p:attrNameLst>
                                           <p:attrName>style.visibility</p:attrName>
@@ -9120,7 +9511,7 @@
                                           </p:stCondLst>
                                         </p:cTn>
                                         <p:tgtEl>
-                                          <p:spTgt spid="93"/>
+                                          <p:spTgt spid="92"/>
                                         </p:tgtEl>
                                         <p:attrNameLst>
                                           <p:attrName>style.visibility</p:attrName>
@@ -9165,7 +9556,7 @@
                                           </p:stCondLst>
                                         </p:cTn>
                                         <p:tgtEl>
-                                          <p:spTgt spid="89"/>
+                                          <p:spTgt spid="118"/>
                                         </p:tgtEl>
                                         <p:attrNameLst>
                                           <p:attrName>style.visibility</p:attrName>
@@ -9210,7 +9601,7 @@
                                           </p:stCondLst>
                                         </p:cTn>
                                         <p:tgtEl>
-                                          <p:spTgt spid="92"/>
+                                          <p:spTgt spid="121"/>
                                         </p:tgtEl>
                                         <p:attrNameLst>
                                           <p:attrName>style.visibility</p:attrName>
@@ -9255,7 +9646,7 @@
                                           </p:stCondLst>
                                         </p:cTn>
                                         <p:tgtEl>
-                                          <p:spTgt spid="118"/>
+                                          <p:spTgt spid="117"/>
                                         </p:tgtEl>
                                         <p:attrNameLst>
                                           <p:attrName>style.visibility</p:attrName>
@@ -9300,7 +9691,7 @@
                                           </p:stCondLst>
                                         </p:cTn>
                                         <p:tgtEl>
-                                          <p:spTgt spid="121"/>
+                                          <p:spTgt spid="120"/>
                                         </p:tgtEl>
                                         <p:attrNameLst>
                                           <p:attrName>style.visibility</p:attrName>
@@ -9345,7 +9736,7 @@
                                           </p:stCondLst>
                                         </p:cTn>
                                         <p:tgtEl>
-                                          <p:spTgt spid="117"/>
+                                          <p:spTgt spid="116"/>
                                         </p:tgtEl>
                                         <p:attrNameLst>
                                           <p:attrName>style.visibility</p:attrName>
@@ -9390,7 +9781,7 @@
                                           </p:stCondLst>
                                         </p:cTn>
                                         <p:tgtEl>
-                                          <p:spTgt spid="120"/>
+                                          <p:spTgt spid="119"/>
                                         </p:tgtEl>
                                         <p:attrNameLst>
                                           <p:attrName>style.visibility</p:attrName>
@@ -9435,7 +9826,7 @@
                                           </p:stCondLst>
                                         </p:cTn>
                                         <p:tgtEl>
-                                          <p:spTgt spid="116"/>
+                                          <p:spTgt spid="100"/>
                                         </p:tgtEl>
                                         <p:attrNameLst>
                                           <p:attrName>style.visibility</p:attrName>
@@ -9467,7 +9858,7 @@
                             </p:stCondLst>
                             <p:childTnLst>
                               <p:par>
-                                <p:cTn id="237" presetID="1" presetClass="entr" presetSubtype="0" fill="hold" nodeType="clickEffect">
+                                <p:cTn id="237" presetID="1" presetClass="entr" presetSubtype="0" fill="hold" grpId="0" nodeType="clickEffect">
                                   <p:stCondLst>
                                     <p:cond delay="0"/>
                                   </p:stCondLst>
@@ -9480,7 +9871,7 @@
                                           </p:stCondLst>
                                         </p:cTn>
                                         <p:tgtEl>
-                                          <p:spTgt spid="119"/>
+                                          <p:spTgt spid="99"/>
                                         </p:tgtEl>
                                         <p:attrNameLst>
                                           <p:attrName>style.visibility</p:attrName>
@@ -9525,7 +9916,7 @@
                                           </p:stCondLst>
                                         </p:cTn>
                                         <p:tgtEl>
-                                          <p:spTgt spid="100"/>
+                                          <p:spTgt spid="101"/>
                                         </p:tgtEl>
                                         <p:attrNameLst>
                                           <p:attrName>style.visibility</p:attrName>
@@ -9570,7 +9961,7 @@
                                           </p:stCondLst>
                                         </p:cTn>
                                         <p:tgtEl>
-                                          <p:spTgt spid="99"/>
+                                          <p:spTgt spid="103"/>
                                         </p:tgtEl>
                                         <p:attrNameLst>
                                           <p:attrName>style.visibility</p:attrName>
@@ -9615,7 +10006,7 @@
                                           </p:stCondLst>
                                         </p:cTn>
                                         <p:tgtEl>
-                                          <p:spTgt spid="101"/>
+                                          <p:spTgt spid="102"/>
                                         </p:tgtEl>
                                         <p:attrNameLst>
                                           <p:attrName>style.visibility</p:attrName>
@@ -9660,7 +10051,7 @@
                                           </p:stCondLst>
                                         </p:cTn>
                                         <p:tgtEl>
-                                          <p:spTgt spid="103"/>
+                                          <p:spTgt spid="104"/>
                                         </p:tgtEl>
                                         <p:attrNameLst>
                                           <p:attrName>style.visibility</p:attrName>
@@ -9700,96 +10091,6 @@
                                     <p:set>
                                       <p:cBhvr>
                                         <p:cTn id="258" dur="1" fill="hold">
-                                          <p:stCondLst>
-                                            <p:cond delay="0"/>
-                                          </p:stCondLst>
-                                        </p:cTn>
-                                        <p:tgtEl>
-                                          <p:spTgt spid="102"/>
-                                        </p:tgtEl>
-                                        <p:attrNameLst>
-                                          <p:attrName>style.visibility</p:attrName>
-                                        </p:attrNameLst>
-                                      </p:cBhvr>
-                                      <p:to>
-                                        <p:strVal val="visible"/>
-                                      </p:to>
-                                    </p:set>
-                                  </p:childTnLst>
-                                </p:cTn>
-                              </p:par>
-                            </p:childTnLst>
-                          </p:cTn>
-                        </p:par>
-                      </p:childTnLst>
-                    </p:cTn>
-                  </p:par>
-                  <p:par>
-                    <p:cTn id="259" fill="hold">
-                      <p:stCondLst>
-                        <p:cond delay="indefinite"/>
-                      </p:stCondLst>
-                      <p:childTnLst>
-                        <p:par>
-                          <p:cTn id="260" fill="hold">
-                            <p:stCondLst>
-                              <p:cond delay="0"/>
-                            </p:stCondLst>
-                            <p:childTnLst>
-                              <p:par>
-                                <p:cTn id="261" presetID="1" presetClass="entr" presetSubtype="0" fill="hold" grpId="0" nodeType="clickEffect">
-                                  <p:stCondLst>
-                                    <p:cond delay="0"/>
-                                  </p:stCondLst>
-                                  <p:childTnLst>
-                                    <p:set>
-                                      <p:cBhvr>
-                                        <p:cTn id="262" dur="1" fill="hold">
-                                          <p:stCondLst>
-                                            <p:cond delay="0"/>
-                                          </p:stCondLst>
-                                        </p:cTn>
-                                        <p:tgtEl>
-                                          <p:spTgt spid="104"/>
-                                        </p:tgtEl>
-                                        <p:attrNameLst>
-                                          <p:attrName>style.visibility</p:attrName>
-                                        </p:attrNameLst>
-                                      </p:cBhvr>
-                                      <p:to>
-                                        <p:strVal val="visible"/>
-                                      </p:to>
-                                    </p:set>
-                                  </p:childTnLst>
-                                </p:cTn>
-                              </p:par>
-                            </p:childTnLst>
-                          </p:cTn>
-                        </p:par>
-                      </p:childTnLst>
-                    </p:cTn>
-                  </p:par>
-                  <p:par>
-                    <p:cTn id="263" fill="hold">
-                      <p:stCondLst>
-                        <p:cond delay="indefinite"/>
-                      </p:stCondLst>
-                      <p:childTnLst>
-                        <p:par>
-                          <p:cTn id="264" fill="hold">
-                            <p:stCondLst>
-                              <p:cond delay="0"/>
-                            </p:stCondLst>
-                            <p:childTnLst>
-                              <p:par>
-                                <p:cTn id="265" presetID="1" presetClass="entr" presetSubtype="0" fill="hold" grpId="0" nodeType="clickEffect">
-                                  <p:stCondLst>
-                                    <p:cond delay="0"/>
-                                  </p:stCondLst>
-                                  <p:childTnLst>
-                                    <p:set>
-                                      <p:cBhvr>
-                                        <p:cTn id="266" dur="1" fill="hold">
                                           <p:stCondLst>
                                             <p:cond delay="0"/>
                                           </p:stCondLst>
@@ -9836,7 +10137,6 @@
       </p:par>
     </p:tnLst>
     <p:bldLst>
-      <p:bldP spid="7" grpId="0"/>
       <p:bldP spid="8" grpId="0"/>
       <p:bldP spid="9" grpId="0"/>
       <p:bldP spid="10" grpId="0"/>

</xml_diff>